<commit_message>
note about Tuesday added
</commit_message>
<xml_diff>
--- a/format-encodings/slide_presentations/.hidden/introduction-to-encodings.pptx
+++ b/format-encodings/slide_presentations/.hidden/introduction-to-encodings.pptx
@@ -23185,7 +23185,7 @@
         </p:nvSpPr>
         <p:spPr>
           <a:xfrm>
-            <a:off x="6296100" y="-101259"/>
+            <a:off x="6144900" y="1489791"/>
             <a:ext cx="2847900" cy="1436100"/>
           </a:xfrm>
           <a:prstGeom prst="rect">
@@ -28709,7 +28709,7 @@
         </p:nvSpPr>
         <p:spPr>
           <a:xfrm>
-            <a:off x="1408612" y="499897"/>
+            <a:off x="1506475" y="112885"/>
             <a:ext cx="6778800" cy="652200"/>
           </a:xfrm>
           <a:prstGeom prst="rect">

</xml_diff>